<commit_message>
Fixing a typo in Week 5
</commit_message>
<xml_diff>
--- a/Week 5 - Preattentive and ggplot/Week 5 Homework.pptx
+++ b/Week 5 - Preattentive and ggplot/Week 5 Homework.pptx
@@ -263,7 +263,7 @@
           <a:p>
             <a:fld id="{9E30B166-B96F-EE47-9501-37B4AB134360}" type="datetimeFigureOut">
               <a:rPr lang="en-US" smtClean="0"/>
-              <a:t>9/30/20</a:t>
+              <a:t>10/2/20</a:t>
             </a:fld>
             <a:endParaRPr lang="en-US"/>
           </a:p>
@@ -440,7 +440,7 @@
           <a:p>
             <a:fld id="{03A1D146-B4E0-1741-B9EE-9789392EFCC4}" type="datetimeFigureOut">
               <a:rPr lang="en-US" smtClean="0"/>
-              <a:t>9/30/20</a:t>
+              <a:t>10/2/20</a:t>
             </a:fld>
             <a:endParaRPr lang="en-US"/>
           </a:p>
@@ -3751,7 +3751,7 @@
             </a:pPr>
             <a:r>
               <a:rPr lang="en-US" dirty="0"/>
-              <a:t>Slide 3(s): Iterate on your slide 1 viz to improve it. Use whatever tool, but Excel/PowerPoint. Be sure to include a good takeaway statement that tells the story of the viz.</a:t>
+              <a:t>Slide 3(s): Iterate on your slide 1 viz to improve it. Use whatever tool. Excel/PowerPoint are recommended. Be sure to include a good takeaway statement that tells the story of the viz.</a:t>
             </a:r>
           </a:p>
           <a:p>

</xml_diff>